<commit_message>
Added some more stake holders and generalized some similar ones into one
</commit_message>
<xml_diff>
--- a/Short_desc___Stakeholders.pptx
+++ b/Short_desc___Stakeholders.pptx
@@ -1049,7 +1049,7 @@
           <a:p>
             <a:fld id="{9E016143-E03C-4CFD-AFDC-14E5BDEA754C}" type="datetimeFigureOut">
               <a:rPr lang="en-US" dirty="0"/>
-              <a:t>3/7/2024</a:t>
+              <a:t>3/8/2024</a:t>
             </a:fld>
             <a:endParaRPr lang="en-US" dirty="0"/>
           </a:p>
@@ -1287,7 +1287,7 @@
           <a:p>
             <a:fld id="{C033E54A-A8CA-48C1-9504-691B58049D29}" type="datetimeFigureOut">
               <a:rPr lang="en-US" dirty="0"/>
-              <a:t>3/7/2024</a:t>
+              <a:t>3/8/2024</a:t>
             </a:fld>
             <a:endParaRPr lang="en-US" dirty="0"/>
           </a:p>
@@ -1477,7 +1477,7 @@
           <a:p>
             <a:fld id="{B5F6C806-BBF7-471C-9527-881CE2266695}" type="datetimeFigureOut">
               <a:rPr lang="en-US" dirty="0"/>
-              <a:t>3/7/2024</a:t>
+              <a:t>3/8/2024</a:t>
             </a:fld>
             <a:endParaRPr lang="en-US" dirty="0"/>
           </a:p>
@@ -2024,7 +2024,7 @@
           <a:p>
             <a:fld id="{78C94063-DF36-4330-A365-08DA1FA5B7D6}" type="datetimeFigureOut">
               <a:rPr lang="en-US" dirty="0"/>
-              <a:t>3/7/2024</a:t>
+              <a:t>3/8/2024</a:t>
             </a:fld>
             <a:endParaRPr lang="en-US" dirty="0"/>
           </a:p>
@@ -2288,7 +2288,7 @@
           <a:p>
             <a:fld id="{908A7C6C-0F39-4D70-8E8D-FE5B9C95FA73}" type="datetimeFigureOut">
               <a:rPr lang="en-US" dirty="0"/>
-              <a:t>3/7/2024</a:t>
+              <a:t>3/8/2024</a:t>
             </a:fld>
             <a:endParaRPr lang="en-US" dirty="0"/>
           </a:p>
@@ -2624,7 +2624,7 @@
           <a:p>
             <a:fld id="{DFCFA4AC-08CC-42CE-BD01-C191750A04EC}" type="datetimeFigureOut">
               <a:rPr lang="en-US" dirty="0"/>
-              <a:t>3/7/2024</a:t>
+              <a:t>3/8/2024</a:t>
             </a:fld>
             <a:endParaRPr lang="en-US" dirty="0"/>
           </a:p>
@@ -3085,7 +3085,7 @@
           <a:p>
             <a:fld id="{1BA7A723-92A7-435B-B681-F25B092FEFEB}" type="datetimeFigureOut">
               <a:rPr lang="en-US" dirty="0"/>
-              <a:t>3/7/2024</a:t>
+              <a:t>3/8/2024</a:t>
             </a:fld>
             <a:endParaRPr lang="en-US" dirty="0"/>
           </a:p>
@@ -3213,7 +3213,7 @@
           <a:p>
             <a:fld id="{4F170639-886C-4FCF-9EAB-ABB5DA3F3F4A}" type="datetimeFigureOut">
               <a:rPr lang="en-US" dirty="0"/>
-              <a:t>3/7/2024</a:t>
+              <a:t>3/8/2024</a:t>
             </a:fld>
             <a:endParaRPr lang="en-US" dirty="0"/>
           </a:p>
@@ -3318,7 +3318,7 @@
           <a:p>
             <a:fld id="{22230651-31F4-45D2-98AE-A2108F41BC07}" type="datetimeFigureOut">
               <a:rPr lang="en-US" dirty="0"/>
-              <a:t>3/7/2024</a:t>
+              <a:t>3/8/2024</a:t>
             </a:fld>
             <a:endParaRPr lang="en-US" dirty="0"/>
           </a:p>
@@ -3614,7 +3614,7 @@
           <a:p>
             <a:fld id="{6F53789A-C914-4DB1-8815-80B5EC7335C5}" type="datetimeFigureOut">
               <a:rPr lang="en-US" dirty="0"/>
-              <a:t>3/7/2024</a:t>
+              <a:t>3/8/2024</a:t>
             </a:fld>
             <a:endParaRPr lang="en-US" dirty="0"/>
           </a:p>
@@ -3946,7 +3946,7 @@
           <a:p>
             <a:fld id="{5E6440AA-91A0-436F-8FDB-C0F939DCAE21}" type="datetimeFigureOut">
               <a:rPr lang="en-US" dirty="0"/>
-              <a:t>3/7/2024</a:t>
+              <a:t>3/8/2024</a:t>
             </a:fld>
             <a:endParaRPr lang="en-US" dirty="0"/>
           </a:p>
@@ -4210,7 +4210,7 @@
           <a:p>
             <a:fld id="{0E59FD0C-5451-4CA0-86AF-E70AE3279989}" type="datetimeFigureOut">
               <a:rPr lang="en-US" dirty="0"/>
-              <a:t>3/7/2024</a:t>
+              <a:t>3/8/2024</a:t>
             </a:fld>
             <a:endParaRPr lang="en-US" dirty="0"/>
           </a:p>
@@ -5084,7 +5084,7 @@
               <a:rPr lang="en" sz="2000" i="1" dirty="0">
                 <a:latin typeface="Bodoni MT" panose="02070603080606020203" pitchFamily="18" charset="0"/>
               </a:rPr>
-              <a:t>3.Front Desk Staff</a:t>
+              <a:t>3.Employees</a:t>
             </a:r>
             <a:endParaRPr sz="2000" i="1" dirty="0">
               <a:latin typeface="Bodoni MT" panose="02070603080606020203" pitchFamily="18" charset="0"/>
@@ -5105,7 +5105,7 @@
               <a:rPr lang="en" sz="2000" i="1" dirty="0">
                 <a:latin typeface="Bodoni MT" panose="02070603080606020203" pitchFamily="18" charset="0"/>
               </a:rPr>
-              <a:t>4.Housekeeping Staff</a:t>
+              <a:t>4.Regulatory Authorities</a:t>
             </a:r>
             <a:endParaRPr sz="2000" i="1" dirty="0">
               <a:latin typeface="Bodoni MT" panose="02070603080606020203" pitchFamily="18" charset="0"/>
@@ -5126,7 +5126,7 @@
               <a:rPr lang="en" sz="2000" i="1" dirty="0">
                 <a:latin typeface="Bodoni MT" panose="02070603080606020203" pitchFamily="18" charset="0"/>
               </a:rPr>
-              <a:t>5.Maintenance Staff</a:t>
+              <a:t>5. Supliers</a:t>
             </a:r>
             <a:endParaRPr sz="2000" i="1" dirty="0">
               <a:latin typeface="Bodoni MT" panose="02070603080606020203" pitchFamily="18" charset="0"/>
@@ -5168,7 +5168,7 @@
               <a:rPr lang="en" sz="2000" i="1" dirty="0">
                 <a:latin typeface="Bodoni MT" panose="02070603080606020203" pitchFamily="18" charset="0"/>
               </a:rPr>
-              <a:t>7.IT department</a:t>
+              <a:t>7.Tourism agency</a:t>
             </a:r>
             <a:endParaRPr sz="2000" i="1" dirty="0">
               <a:latin typeface="Bodoni MT" panose="02070603080606020203" pitchFamily="18" charset="0"/>
@@ -5190,6 +5190,24 @@
                 <a:latin typeface="Bodoni MT" panose="02070603080606020203" pitchFamily="18" charset="0"/>
               </a:rPr>
               <a:t>8.Investors and shareholders</a:t>
+            </a:r>
+          </a:p>
+          <a:p>
+            <a:pPr marL="457200" lvl="0" indent="-228600" algn="l" rtl="0">
+              <a:spcBef>
+                <a:spcPts val="0"/>
+              </a:spcBef>
+              <a:spcAft>
+                <a:spcPts val="0"/>
+              </a:spcAft>
+              <a:buSzPts val="1800"/>
+              <a:buNone/>
+            </a:pPr>
+            <a:r>
+              <a:rPr lang="en" sz="2000" i="1">
+                <a:latin typeface="Bodoni MT" panose="02070603080606020203" pitchFamily="18" charset="0"/>
+              </a:rPr>
+              <a:t>9.Marketing Platforms</a:t>
             </a:r>
             <a:endParaRPr sz="2000" i="1" dirty="0">
               <a:latin typeface="Bodoni MT" panose="02070603080606020203" pitchFamily="18" charset="0"/>

</xml_diff>